<commit_message>
type fix and pres1 update
</commit_message>
<xml_diff>
--- a/docs/Presentation1__introduction.pptx
+++ b/docs/Presentation1__introduction.pptx
@@ -5,7 +5,7 @@
     <p:sldMasterId id="2147483648" r:id="rId1"/>
   </p:sldMasterIdLst>
   <p:notesMasterIdLst>
-    <p:notesMasterId r:id="rId17"/>
+    <p:notesMasterId r:id="rId15"/>
   </p:notesMasterIdLst>
   <p:sldIdLst>
     <p:sldId id="257" r:id="rId2"/>
@@ -20,9 +20,7 @@
     <p:sldId id="268" r:id="rId11"/>
     <p:sldId id="265" r:id="rId12"/>
     <p:sldId id="271" r:id="rId13"/>
-    <p:sldId id="269" r:id="rId14"/>
-    <p:sldId id="270" r:id="rId15"/>
-    <p:sldId id="267" r:id="rId16"/>
+    <p:sldId id="267" r:id="rId14"/>
   </p:sldIdLst>
   <p:sldSz cx="9144000" cy="6858000" type="screen4x3"/>
   <p:notesSz cx="6858000" cy="9144000"/>
@@ -123,7 +121,7 @@
   </p:defaultTextStyle>
   <p:extLst>
     <p:ext uri="{EFAFB233-063F-42B5-8137-9DF3F51BA10A}">
-      <p15:sldGuideLst xmlns:p15="http://schemas.microsoft.com/office/powerpoint/2012/main">
+      <p15:sldGuideLst xmlns:p15="http://schemas.microsoft.com/office/powerpoint/2012/main" xmlns="">
         <p15:guide id="1" orient="horz" pos="2160">
           <p15:clr>
             <a:srgbClr val="A4A3A4"/>
@@ -222,7 +220,7 @@
           <a:p>
             <a:fld id="{B3DA9FD2-6124-8144-B472-3FAD8B43487F}" type="datetimeFigureOut">
               <a:rPr lang="en-US" smtClean="0"/>
-              <a:t>1/4/2015</a:t>
+              <a:t>1/5/15</a:t>
             </a:fld>
             <a:endParaRPr lang="en-US"/>
           </a:p>
@@ -4611,14 +4609,6 @@
               </a:rPr>
               <a:t>Introduction</a:t>
             </a:r>
-            <a:r>
-              <a:rPr lang="en-US" sz="2800" dirty="0" smtClean="0">
-                <a:solidFill>
-                  <a:srgbClr val="092C74"/>
-                </a:solidFill>
-              </a:rPr>
-              <a:t/>
-            </a:r>
             <a:br>
               <a:rPr lang="en-US" sz="2800" dirty="0" smtClean="0">
                 <a:solidFill>
@@ -4655,7 +4645,7 @@
   <p:timing>
     <p:tnLst>
       <p:par>
-        <p:cTn id="1" dur="indefinite" restart="never" nodeType="tmRoot"/>
+        <p:cTn xmlns:p14="http://schemas.microsoft.com/office/powerpoint/2010/main" id="1" dur="indefinite" restart="never" nodeType="tmRoot"/>
       </p:par>
     </p:tnLst>
   </p:timing>
@@ -4822,6 +4812,13 @@
   <p:clrMapOvr>
     <a:masterClrMapping/>
   </p:clrMapOvr>
+  <p:timing>
+    <p:tnLst>
+      <p:par>
+        <p:cTn xmlns:p14="http://schemas.microsoft.com/office/powerpoint/2010/main" id="1" dur="indefinite" restart="never" nodeType="tmRoot"/>
+      </p:par>
+    </p:tnLst>
+  </p:timing>
 </p:sld>
 </file>
 
@@ -4986,6 +4983,13 @@
   <p:clrMapOvr>
     <a:masterClrMapping/>
   </p:clrMapOvr>
+  <p:timing>
+    <p:tnLst>
+      <p:par>
+        <p:cTn xmlns:p14="http://schemas.microsoft.com/office/powerpoint/2010/main" id="1" dur="indefinite" restart="never" nodeType="tmRoot"/>
+      </p:par>
+    </p:tnLst>
+  </p:timing>
 </p:sld>
 </file>
 
@@ -5135,7 +5139,7 @@
           </a:prstGeom>
           <a:noFill/>
           <a:extLst>
-            <a:ext uri="{909E8E84-426E-40DD-AFC4-6F175D3DCCD1}">
+            <a:ext uri="{909E8E84-426E-40dd-AFC4-6F175D3DCCD1}">
               <a14:hiddenFill xmlns:a14="http://schemas.microsoft.com/office/drawing/2010/main">
                 <a:solidFill>
                   <a:srgbClr val="FFFFFF"/>
@@ -5155,6 +5159,13 @@
   <p:clrMapOvr>
     <a:masterClrMapping/>
   </p:clrMapOvr>
+  <p:timing>
+    <p:tnLst>
+      <p:par>
+        <p:cTn xmlns:p14="http://schemas.microsoft.com/office/powerpoint/2010/main" id="1" dur="indefinite" restart="never" nodeType="tmRoot"/>
+      </p:par>
+    </p:tnLst>
+  </p:timing>
 </p:sld>
 </file>
 
@@ -5192,266 +5203,6 @@
           <a:p>
             <a:r>
               <a:rPr lang="en-US" dirty="0" smtClean="0"/>
-              <a:t>Talk about My Computer</a:t>
-            </a:r>
-            <a:endParaRPr lang="en-US" dirty="0"/>
-          </a:p>
-        </p:txBody>
-      </p:sp>
-      <p:sp>
-        <p:nvSpPr>
-          <p:cNvPr id="3" name="Content Placeholder 2"/>
-          <p:cNvSpPr>
-            <a:spLocks noGrp="1"/>
-          </p:cNvSpPr>
-          <p:nvPr>
-            <p:ph idx="1"/>
-          </p:nvPr>
-        </p:nvSpPr>
-        <p:spPr/>
-        <p:txBody>
-          <a:bodyPr/>
-          <a:lstStyle/>
-          <a:p>
-            <a:r>
-              <a:rPr lang="en-US" dirty="0" smtClean="0"/>
-              <a:t>Pictures of my computer</a:t>
-            </a:r>
-          </a:p>
-          <a:p>
-            <a:endParaRPr lang="en-US" dirty="0"/>
-          </a:p>
-          <a:p>
-            <a:r>
-              <a:rPr lang="en-US" dirty="0" smtClean="0"/>
-              <a:t>What do I do with it</a:t>
-            </a:r>
-          </a:p>
-          <a:p>
-            <a:endParaRPr lang="en-US" dirty="0"/>
-          </a:p>
-          <a:p>
-            <a:r>
-              <a:rPr lang="en-US" dirty="0" smtClean="0"/>
-              <a:t>What’s custom about it</a:t>
-            </a:r>
-            <a:endParaRPr lang="en-US" dirty="0"/>
-          </a:p>
-        </p:txBody>
-      </p:sp>
-      <p:sp>
-        <p:nvSpPr>
-          <p:cNvPr id="4" name="Date Placeholder 3"/>
-          <p:cNvSpPr>
-            <a:spLocks noGrp="1"/>
-          </p:cNvSpPr>
-          <p:nvPr>
-            <p:ph type="dt" sz="half" idx="10"/>
-          </p:nvPr>
-        </p:nvSpPr>
-        <p:spPr/>
-        <p:txBody>
-          <a:bodyPr/>
-          <a:lstStyle/>
-          <a:p>
-            <a:r>
-              <a:rPr lang="en-US" smtClean="0"/>
-              <a:t>1/5/2015</a:t>
-            </a:r>
-            <a:endParaRPr lang="en-US"/>
-          </a:p>
-        </p:txBody>
-      </p:sp>
-      <p:sp>
-        <p:nvSpPr>
-          <p:cNvPr id="5" name="Slide Number Placeholder 4"/>
-          <p:cNvSpPr>
-            <a:spLocks noGrp="1"/>
-          </p:cNvSpPr>
-          <p:nvPr>
-            <p:ph type="sldNum" sz="quarter" idx="12"/>
-          </p:nvPr>
-        </p:nvSpPr>
-        <p:spPr/>
-        <p:txBody>
-          <a:bodyPr/>
-          <a:lstStyle/>
-          <a:p>
-            <a:fld id="{2F6D7BE5-C7A7-AC4F-A249-F57AAD68BB55}" type="slidenum">
-              <a:rPr lang="en-US" smtClean="0"/>
-              <a:t>13</a:t>
-            </a:fld>
-            <a:endParaRPr lang="en-US"/>
-          </a:p>
-        </p:txBody>
-      </p:sp>
-    </p:spTree>
-    <p:extLst>
-      <p:ext uri="{BB962C8B-B14F-4D97-AF65-F5344CB8AC3E}">
-        <p14:creationId xmlns:p14="http://schemas.microsoft.com/office/powerpoint/2010/main" val="1018731689"/>
-      </p:ext>
-    </p:extLst>
-  </p:cSld>
-  <p:clrMapOvr>
-    <a:masterClrMapping/>
-  </p:clrMapOvr>
-</p:sld>
-</file>
-
-<file path=ppt/slides/slide14.xml><?xml version="1.0" encoding="utf-8"?>
-<p:sld xmlns:a="http://schemas.openxmlformats.org/drawingml/2006/main" xmlns:r="http://schemas.openxmlformats.org/officeDocument/2006/relationships" xmlns:p="http://schemas.openxmlformats.org/presentationml/2006/main">
-  <p:cSld>
-    <p:spTree>
-      <p:nvGrpSpPr>
-        <p:cNvPr id="1" name=""/>
-        <p:cNvGrpSpPr/>
-        <p:nvPr/>
-      </p:nvGrpSpPr>
-      <p:grpSpPr>
-        <a:xfrm>
-          <a:off x="0" y="0"/>
-          <a:ext cx="0" cy="0"/>
-          <a:chOff x="0" y="0"/>
-          <a:chExt cx="0" cy="0"/>
-        </a:xfrm>
-      </p:grpSpPr>
-      <p:sp>
-        <p:nvSpPr>
-          <p:cNvPr id="2" name="Title 1"/>
-          <p:cNvSpPr>
-            <a:spLocks noGrp="1"/>
-          </p:cNvSpPr>
-          <p:nvPr>
-            <p:ph type="title"/>
-          </p:nvPr>
-        </p:nvSpPr>
-        <p:spPr/>
-        <p:txBody>
-          <a:bodyPr>
-            <a:normAutofit fontScale="90000"/>
-          </a:bodyPr>
-          <a:lstStyle/>
-          <a:p>
-            <a:r>
-              <a:rPr lang="en-US" dirty="0" smtClean="0"/>
-              <a:t>Talk about Components of Computers</a:t>
-            </a:r>
-            <a:endParaRPr lang="en-US" dirty="0"/>
-          </a:p>
-        </p:txBody>
-      </p:sp>
-      <p:sp>
-        <p:nvSpPr>
-          <p:cNvPr id="3" name="Content Placeholder 2"/>
-          <p:cNvSpPr>
-            <a:spLocks noGrp="1"/>
-          </p:cNvSpPr>
-          <p:nvPr>
-            <p:ph idx="1"/>
-          </p:nvPr>
-        </p:nvSpPr>
-        <p:spPr/>
-        <p:txBody>
-          <a:bodyPr/>
-          <a:lstStyle/>
-          <a:p>
-            <a:endParaRPr lang="en-US"/>
-          </a:p>
-        </p:txBody>
-      </p:sp>
-      <p:sp>
-        <p:nvSpPr>
-          <p:cNvPr id="4" name="Date Placeholder 3"/>
-          <p:cNvSpPr>
-            <a:spLocks noGrp="1"/>
-          </p:cNvSpPr>
-          <p:nvPr>
-            <p:ph type="dt" sz="half" idx="10"/>
-          </p:nvPr>
-        </p:nvSpPr>
-        <p:spPr/>
-        <p:txBody>
-          <a:bodyPr/>
-          <a:lstStyle/>
-          <a:p>
-            <a:r>
-              <a:rPr lang="en-US" smtClean="0"/>
-              <a:t>1/5/2015</a:t>
-            </a:r>
-            <a:endParaRPr lang="en-US"/>
-          </a:p>
-        </p:txBody>
-      </p:sp>
-      <p:sp>
-        <p:nvSpPr>
-          <p:cNvPr id="5" name="Slide Number Placeholder 4"/>
-          <p:cNvSpPr>
-            <a:spLocks noGrp="1"/>
-          </p:cNvSpPr>
-          <p:nvPr>
-            <p:ph type="sldNum" sz="quarter" idx="12"/>
-          </p:nvPr>
-        </p:nvSpPr>
-        <p:spPr/>
-        <p:txBody>
-          <a:bodyPr/>
-          <a:lstStyle/>
-          <a:p>
-            <a:fld id="{2F6D7BE5-C7A7-AC4F-A249-F57AAD68BB55}" type="slidenum">
-              <a:rPr lang="en-US" smtClean="0"/>
-              <a:t>14</a:t>
-            </a:fld>
-            <a:endParaRPr lang="en-US"/>
-          </a:p>
-        </p:txBody>
-      </p:sp>
-    </p:spTree>
-    <p:extLst>
-      <p:ext uri="{BB962C8B-B14F-4D97-AF65-F5344CB8AC3E}">
-        <p14:creationId xmlns:p14="http://schemas.microsoft.com/office/powerpoint/2010/main" val="1967989614"/>
-      </p:ext>
-    </p:extLst>
-  </p:cSld>
-  <p:clrMapOvr>
-    <a:masterClrMapping/>
-  </p:clrMapOvr>
-</p:sld>
-</file>
-
-<file path=ppt/slides/slide15.xml><?xml version="1.0" encoding="utf-8"?>
-<p:sld xmlns:a="http://schemas.openxmlformats.org/drawingml/2006/main" xmlns:r="http://schemas.openxmlformats.org/officeDocument/2006/relationships" xmlns:p="http://schemas.openxmlformats.org/presentationml/2006/main">
-  <p:cSld>
-    <p:spTree>
-      <p:nvGrpSpPr>
-        <p:cNvPr id="1" name=""/>
-        <p:cNvGrpSpPr/>
-        <p:nvPr/>
-      </p:nvGrpSpPr>
-      <p:grpSpPr>
-        <a:xfrm>
-          <a:off x="0" y="0"/>
-          <a:ext cx="0" cy="0"/>
-          <a:chOff x="0" y="0"/>
-          <a:chExt cx="0" cy="0"/>
-        </a:xfrm>
-      </p:grpSpPr>
-      <p:sp>
-        <p:nvSpPr>
-          <p:cNvPr id="2" name="Title 1"/>
-          <p:cNvSpPr>
-            <a:spLocks noGrp="1"/>
-          </p:cNvSpPr>
-          <p:nvPr>
-            <p:ph type="title"/>
-          </p:nvPr>
-        </p:nvSpPr>
-        <p:spPr/>
-        <p:txBody>
-          <a:bodyPr/>
-          <a:lstStyle/>
-          <a:p>
-            <a:r>
-              <a:rPr lang="en-US" dirty="0" smtClean="0"/>
               <a:t>Assemble Groups</a:t>
             </a:r>
             <a:endParaRPr lang="en-US" dirty="0"/>
@@ -5574,7 +5325,7 @@
           <a:p>
             <a:fld id="{2F6D7BE5-C7A7-AC4F-A249-F57AAD68BB55}" type="slidenum">
               <a:rPr lang="en-US" smtClean="0"/>
-              <a:t>15</a:t>
+              <a:t>13</a:t>
             </a:fld>
             <a:endParaRPr lang="en-US"/>
           </a:p>
@@ -5590,6 +5341,13 @@
   <p:clrMapOvr>
     <a:masterClrMapping/>
   </p:clrMapOvr>
+  <p:timing>
+    <p:tnLst>
+      <p:par>
+        <p:cTn xmlns:p14="http://schemas.microsoft.com/office/powerpoint/2010/main" id="1" dur="indefinite" restart="never" nodeType="tmRoot"/>
+      </p:par>
+    </p:tnLst>
+  </p:timing>
 </p:sld>
 </file>
 
@@ -5763,7 +5521,7 @@
           </a:prstGeom>
           <a:noFill/>
           <a:extLst>
-            <a:ext uri="{909E8E84-426E-40DD-AFC4-6F175D3DCCD1}">
+            <a:ext uri="{909E8E84-426E-40dd-AFC4-6F175D3DCCD1}">
               <a14:hiddenFill xmlns:a14="http://schemas.microsoft.com/office/drawing/2010/main">
                 <a:solidFill>
                   <a:srgbClr val="FFFFFF"/>
@@ -5881,7 +5639,7 @@
   <p:timing>
     <p:tnLst>
       <p:par>
-        <p:cTn id="1" dur="indefinite" restart="never" nodeType="tmRoot"/>
+        <p:cTn xmlns:p14="http://schemas.microsoft.com/office/powerpoint/2010/main" id="1" dur="indefinite" restart="never" nodeType="tmRoot"/>
       </p:par>
     </p:tnLst>
   </p:timing>
@@ -6076,7 +5834,7 @@
           </a:prstGeom>
           <a:noFill/>
           <a:extLst>
-            <a:ext uri="{909E8E84-426E-40DD-AFC4-6F175D3DCCD1}">
+            <a:ext uri="{909E8E84-426E-40dd-AFC4-6F175D3DCCD1}">
               <a14:hiddenFill xmlns:a14="http://schemas.microsoft.com/office/drawing/2010/main">
                 <a:solidFill>
                   <a:srgbClr val="FFFFFF"/>
@@ -6233,7 +5991,7 @@
   <p:timing>
     <p:tnLst>
       <p:par>
-        <p:cTn id="1" dur="indefinite" restart="never" nodeType="tmRoot"/>
+        <p:cTn xmlns:p14="http://schemas.microsoft.com/office/powerpoint/2010/main" id="1" dur="indefinite" restart="never" nodeType="tmRoot"/>
       </p:par>
     </p:tnLst>
   </p:timing>
@@ -6499,7 +6257,7 @@
           </a:prstGeom>
           <a:noFill/>
           <a:extLst>
-            <a:ext uri="{909E8E84-426E-40DD-AFC4-6F175D3DCCD1}">
+            <a:ext uri="{909E8E84-426E-40dd-AFC4-6F175D3DCCD1}">
               <a14:hiddenFill xmlns:a14="http://schemas.microsoft.com/office/drawing/2010/main">
                 <a:solidFill>
                   <a:srgbClr val="FFFFFF"/>
@@ -6522,7 +6280,7 @@
   <p:timing>
     <p:tnLst>
       <p:par>
-        <p:cTn id="1" dur="indefinite" restart="never" nodeType="tmRoot"/>
+        <p:cTn xmlns:p14="http://schemas.microsoft.com/office/powerpoint/2010/main" id="1" dur="indefinite" restart="never" nodeType="tmRoot"/>
       </p:par>
     </p:tnLst>
   </p:timing>
@@ -6701,7 +6459,7 @@
   <p:timing>
     <p:tnLst>
       <p:par>
-        <p:cTn id="1" dur="indefinite" restart="never" nodeType="tmRoot"/>
+        <p:cTn xmlns:p14="http://schemas.microsoft.com/office/powerpoint/2010/main" id="1" dur="indefinite" restart="never" nodeType="tmRoot"/>
       </p:par>
     </p:tnLst>
   </p:timing>
@@ -7022,7 +6780,7 @@
           </a:prstGeom>
           <a:noFill/>
           <a:extLst>
-            <a:ext uri="{909E8E84-426E-40DD-AFC4-6F175D3DCCD1}">
+            <a:ext uri="{909E8E84-426E-40dd-AFC4-6F175D3DCCD1}">
               <a14:hiddenFill xmlns:a14="http://schemas.microsoft.com/office/drawing/2010/main">
                 <a:solidFill>
                   <a:srgbClr val="FFFFFF"/>
@@ -7045,7 +6803,7 @@
   <p:timing>
     <p:tnLst>
       <p:par>
-        <p:cTn id="1" dur="indefinite" restart="never" nodeType="tmRoot"/>
+        <p:cTn xmlns:p14="http://schemas.microsoft.com/office/powerpoint/2010/main" id="1" dur="indefinite" restart="never" nodeType="tmRoot"/>
       </p:par>
     </p:tnLst>
   </p:timing>
@@ -7098,7 +6856,7 @@
           </a:prstGeom>
           <a:noFill/>
           <a:extLst>
-            <a:ext uri="{909E8E84-426E-40DD-AFC4-6F175D3DCCD1}">
+            <a:ext uri="{909E8E84-426E-40dd-AFC4-6F175D3DCCD1}">
               <a14:hiddenFill xmlns:a14="http://schemas.microsoft.com/office/drawing/2010/main">
                 <a:solidFill>
                   <a:srgbClr val="FFFFFF"/>
@@ -7291,7 +7049,7 @@
   <p:timing>
     <p:tnLst>
       <p:par>
-        <p:cTn id="1" dur="indefinite" restart="never" nodeType="tmRoot"/>
+        <p:cTn xmlns:p14="http://schemas.microsoft.com/office/powerpoint/2010/main" id="1" dur="indefinite" restart="never" nodeType="tmRoot"/>
       </p:par>
     </p:tnLst>
   </p:timing>
@@ -7453,6 +7211,13 @@
   <p:clrMapOvr>
     <a:masterClrMapping/>
   </p:clrMapOvr>
+  <p:timing>
+    <p:tnLst>
+      <p:par>
+        <p:cTn xmlns:p14="http://schemas.microsoft.com/office/powerpoint/2010/main" id="1" dur="indefinite" restart="never" nodeType="tmRoot"/>
+      </p:par>
+    </p:tnLst>
+  </p:timing>
 </p:sld>
 </file>
 
@@ -7542,6 +7307,36 @@
           </a:p>
         </p:txBody>
       </p:sp>
+      <p:pic>
+        <p:nvPicPr>
+          <p:cNvPr id="3" name="Picture 2" descr="Screen Shot 2015-01-06 at 1.05.18 PM.png"/>
+          <p:cNvPicPr>
+            <a:picLocks noChangeAspect="1"/>
+          </p:cNvPicPr>
+          <p:nvPr/>
+        </p:nvPicPr>
+        <p:blipFill>
+          <a:blip r:embed="rId2">
+            <a:extLst>
+              <a:ext uri="{28A0092B-C50C-407E-A947-70E740481C1C}">
+                <a14:useLocalDpi xmlns:a14="http://schemas.microsoft.com/office/drawing/2010/main" val="0"/>
+              </a:ext>
+            </a:extLst>
+          </a:blip>
+          <a:stretch>
+            <a:fillRect/>
+          </a:stretch>
+        </p:blipFill>
+        <p:spPr>
+          <a:xfrm>
+            <a:off x="755206" y="1589547"/>
+            <a:ext cx="7788062" cy="3506416"/>
+          </a:xfrm>
+          <a:prstGeom prst="rect">
+            <a:avLst/>
+          </a:prstGeom>
+        </p:spPr>
+      </p:pic>
     </p:spTree>
     <p:extLst>
       <p:ext uri="{BB962C8B-B14F-4D97-AF65-F5344CB8AC3E}">
@@ -7552,6 +7347,13 @@
   <p:clrMapOvr>
     <a:masterClrMapping/>
   </p:clrMapOvr>
+  <p:timing>
+    <p:tnLst>
+      <p:par>
+        <p:cTn xmlns:p14="http://schemas.microsoft.com/office/powerpoint/2010/main" id="1" dur="indefinite" restart="never" nodeType="tmRoot"/>
+      </p:par>
+    </p:tnLst>
+  </p:timing>
 </p:sld>
 </file>
 

</xml_diff>